<commit_message>
final changes to evolution presentation
</commit_message>
<xml_diff>
--- a/refactoring-to-ioc/presentation/refactoring-to-ioc.pptx
+++ b/refactoring-to-ioc/presentation/refactoring-to-ioc.pptx
@@ -1707,6 +1707,13 @@
         </dgm:presLayoutVars>
       </dgm:prSet>
       <dgm:spPr/>
+      <dgm:t>
+        <a:bodyPr/>
+        <a:lstStyle/>
+        <a:p>
+          <a:endParaRPr lang="en-US"/>
+        </a:p>
+      </dgm:t>
     </dgm:pt>
     <dgm:pt modelId="{842C0DC4-E1C6-4B7F-9F12-CF3D2E6C9728}" type="pres">
       <dgm:prSet presAssocID="{72CB2B07-09F6-4885-A74F-5777E3A12EB2}" presName="comp1" presStyleCnt="0"/>
@@ -1892,14 +1899,35 @@
         </dgm:presLayoutVars>
       </dgm:prSet>
       <dgm:spPr/>
+      <dgm:t>
+        <a:bodyPr/>
+        <a:lstStyle/>
+        <a:p>
+          <a:endParaRPr lang="en-US"/>
+        </a:p>
+      </dgm:t>
     </dgm:pt>
     <dgm:pt modelId="{A1D65F88-4E41-4878-BEFD-3299DA59D36A}" type="pres">
       <dgm:prSet presAssocID="{1A92768C-E170-42EA-A2F3-E8F069D2709F}" presName="centerShape" presStyleLbl="node0" presStyleIdx="0" presStyleCnt="1" custScaleX="91964" custScaleY="84643" custLinFactNeighborX="-1608" custLinFactNeighborY="-46532"/>
       <dgm:spPr/>
+      <dgm:t>
+        <a:bodyPr/>
+        <a:lstStyle/>
+        <a:p>
+          <a:endParaRPr lang="en-US"/>
+        </a:p>
+      </dgm:t>
     </dgm:pt>
     <dgm:pt modelId="{5893B6E6-AE37-4B7F-8469-4B19B5FADCCA}" type="pres">
       <dgm:prSet presAssocID="{6E9F9E15-6CAC-4631-8C15-3B476C138C60}" presName="parTrans" presStyleLbl="bgSibTrans2D1" presStyleIdx="0" presStyleCnt="1" custLinFactNeighborY="-11759" custRadScaleRad="211664" custRadScaleInc="-2147483648"/>
       <dgm:spPr/>
+      <dgm:t>
+        <a:bodyPr/>
+        <a:lstStyle/>
+        <a:p>
+          <a:endParaRPr lang="en-US"/>
+        </a:p>
+      </dgm:t>
     </dgm:pt>
     <dgm:pt modelId="{8B852E1A-6E86-4FBC-848F-5DC4AA853082}" type="pres">
       <dgm:prSet presAssocID="{76F2EC84-62A4-4EE4-AD0B-44775D3764C1}" presName="node" presStyleLbl="node1" presStyleIdx="0" presStyleCnt="1" custRadScaleRad="5679" custRadScaleInc="-88143">
@@ -1908,6 +1936,13 @@
         </dgm:presLayoutVars>
       </dgm:prSet>
       <dgm:spPr/>
+      <dgm:t>
+        <a:bodyPr/>
+        <a:lstStyle/>
+        <a:p>
+          <a:endParaRPr lang="en-US"/>
+        </a:p>
+      </dgm:t>
     </dgm:pt>
   </dgm:ptLst>
   <dgm:cxnLst>
@@ -5382,7 +5417,8 @@
           <a:p>
             <a:fld id="{7EF14571-6E45-479D-8EAF-A36FF0C632A1}" type="datetimeFigureOut">
               <a:rPr lang="en-US" smtClean="0"/>
-              <a:t>10/11/2010</a:t>
+              <a:pPr/>
+              <a:t>10/22/2010</a:t>
             </a:fld>
             <a:endParaRPr lang="en-US"/>
           </a:p>
@@ -5543,6 +5579,7 @@
           <a:p>
             <a:fld id="{798ABEF9-3A23-41F8-9F5D-74A702B29DE2}" type="slidenum">
               <a:rPr lang="en-US" smtClean="0"/>
+              <a:pPr/>
               <a:t>‹#›</a:t>
             </a:fld>
             <a:endParaRPr lang="en-US"/>
@@ -5714,6 +5751,7 @@
           <a:p>
             <a:fld id="{798ABEF9-3A23-41F8-9F5D-74A702B29DE2}" type="slidenum">
               <a:rPr lang="en-US" smtClean="0"/>
+              <a:pPr/>
               <a:t>4</a:t>
             </a:fld>
             <a:endParaRPr lang="en-US"/>
@@ -5903,7 +5941,8 @@
           <a:p>
             <a:fld id="{03A9975F-C47A-452A-85E0-869F4D5D71B0}" type="datetimeFigureOut">
               <a:rPr lang="en-US" smtClean="0"/>
-              <a:t>10/11/2010</a:t>
+              <a:pPr/>
+              <a:t>10/22/2010</a:t>
             </a:fld>
             <a:endParaRPr lang="en-US"/>
           </a:p>
@@ -5950,6 +5989,7 @@
           <a:p>
             <a:fld id="{9CC4E57B-EE81-4B19-BE1B-C5DF58584E8D}" type="slidenum">
               <a:rPr lang="en-US" smtClean="0"/>
+              <a:pPr/>
               <a:t>‹#›</a:t>
             </a:fld>
             <a:endParaRPr lang="en-US"/>
@@ -6073,7 +6113,8 @@
           <a:p>
             <a:fld id="{03A9975F-C47A-452A-85E0-869F4D5D71B0}" type="datetimeFigureOut">
               <a:rPr lang="en-US" smtClean="0"/>
-              <a:t>10/11/2010</a:t>
+              <a:pPr/>
+              <a:t>10/22/2010</a:t>
             </a:fld>
             <a:endParaRPr lang="en-US"/>
           </a:p>
@@ -6115,6 +6156,7 @@
           <a:p>
             <a:fld id="{9CC4E57B-EE81-4B19-BE1B-C5DF58584E8D}" type="slidenum">
               <a:rPr lang="en-US" smtClean="0"/>
+              <a:pPr/>
               <a:t>‹#›</a:t>
             </a:fld>
             <a:endParaRPr lang="en-US"/>
@@ -6248,7 +6290,8 @@
           <a:p>
             <a:fld id="{03A9975F-C47A-452A-85E0-869F4D5D71B0}" type="datetimeFigureOut">
               <a:rPr lang="en-US" smtClean="0"/>
-              <a:t>10/11/2010</a:t>
+              <a:pPr/>
+              <a:t>10/22/2010</a:t>
             </a:fld>
             <a:endParaRPr lang="en-US"/>
           </a:p>
@@ -6290,6 +6333,7 @@
           <a:p>
             <a:fld id="{9CC4E57B-EE81-4B19-BE1B-C5DF58584E8D}" type="slidenum">
               <a:rPr lang="en-US" smtClean="0"/>
+              <a:pPr/>
               <a:t>‹#›</a:t>
             </a:fld>
             <a:endParaRPr lang="en-US"/>
@@ -6413,7 +6457,8 @@
           <a:p>
             <a:fld id="{03A9975F-C47A-452A-85E0-869F4D5D71B0}" type="datetimeFigureOut">
               <a:rPr lang="en-US" smtClean="0"/>
-              <a:t>10/11/2010</a:t>
+              <a:pPr/>
+              <a:t>10/22/2010</a:t>
             </a:fld>
             <a:endParaRPr lang="en-US"/>
           </a:p>
@@ -6465,6 +6510,7 @@
           <a:p>
             <a:fld id="{9CC4E57B-EE81-4B19-BE1B-C5DF58584E8D}" type="slidenum">
               <a:rPr lang="en-US" smtClean="0"/>
+              <a:pPr/>
               <a:t>‹#›</a:t>
             </a:fld>
             <a:endParaRPr lang="en-US"/>
@@ -6647,7 +6693,8 @@
           <a:p>
             <a:fld id="{03A9975F-C47A-452A-85E0-869F4D5D71B0}" type="datetimeFigureOut">
               <a:rPr lang="en-US" smtClean="0"/>
-              <a:t>10/11/2010</a:t>
+              <a:pPr/>
+              <a:t>10/22/2010</a:t>
             </a:fld>
             <a:endParaRPr lang="en-US"/>
           </a:p>
@@ -6689,6 +6736,7 @@
           <a:p>
             <a:fld id="{9CC4E57B-EE81-4B19-BE1B-C5DF58584E8D}" type="slidenum">
               <a:rPr lang="en-US" smtClean="0"/>
+              <a:pPr/>
               <a:t>‹#›</a:t>
             </a:fld>
             <a:endParaRPr lang="en-US"/>
@@ -6943,7 +6991,8 @@
           <a:p>
             <a:fld id="{03A9975F-C47A-452A-85E0-869F4D5D71B0}" type="datetimeFigureOut">
               <a:rPr lang="en-US" smtClean="0"/>
-              <a:t>10/11/2010</a:t>
+              <a:pPr/>
+              <a:t>10/22/2010</a:t>
             </a:fld>
             <a:endParaRPr lang="en-US"/>
           </a:p>
@@ -6985,6 +7034,7 @@
           <a:p>
             <a:fld id="{9CC4E57B-EE81-4B19-BE1B-C5DF58584E8D}" type="slidenum">
               <a:rPr lang="en-US" smtClean="0"/>
+              <a:pPr/>
               <a:t>‹#›</a:t>
             </a:fld>
             <a:endParaRPr lang="en-US"/>
@@ -7327,7 +7377,8 @@
           <a:p>
             <a:fld id="{03A9975F-C47A-452A-85E0-869F4D5D71B0}" type="datetimeFigureOut">
               <a:rPr lang="en-US" smtClean="0"/>
-              <a:t>10/11/2010</a:t>
+              <a:pPr/>
+              <a:t>10/22/2010</a:t>
             </a:fld>
             <a:endParaRPr lang="en-US"/>
           </a:p>
@@ -7374,6 +7425,7 @@
           <a:p>
             <a:fld id="{9CC4E57B-EE81-4B19-BE1B-C5DF58584E8D}" type="slidenum">
               <a:rPr lang="en-US" smtClean="0"/>
+              <a:pPr/>
               <a:t>‹#›</a:t>
             </a:fld>
             <a:endParaRPr lang="en-US"/>
@@ -7500,7 +7552,8 @@
           <a:p>
             <a:fld id="{03A9975F-C47A-452A-85E0-869F4D5D71B0}" type="datetimeFigureOut">
               <a:rPr lang="en-US" smtClean="0"/>
-              <a:t>10/11/2010</a:t>
+              <a:pPr/>
+              <a:t>10/22/2010</a:t>
             </a:fld>
             <a:endParaRPr lang="en-US"/>
           </a:p>
@@ -7542,6 +7595,7 @@
           <a:p>
             <a:fld id="{9CC4E57B-EE81-4B19-BE1B-C5DF58584E8D}" type="slidenum">
               <a:rPr lang="en-US" smtClean="0"/>
+              <a:pPr/>
               <a:t>‹#›</a:t>
             </a:fld>
             <a:endParaRPr lang="en-US"/>
@@ -7590,7 +7644,8 @@
           <a:p>
             <a:fld id="{03A9975F-C47A-452A-85E0-869F4D5D71B0}" type="datetimeFigureOut">
               <a:rPr lang="en-US" smtClean="0"/>
-              <a:t>10/11/2010</a:t>
+              <a:pPr/>
+              <a:t>10/22/2010</a:t>
             </a:fld>
             <a:endParaRPr lang="en-US"/>
           </a:p>
@@ -7632,6 +7687,7 @@
           <a:p>
             <a:fld id="{9CC4E57B-EE81-4B19-BE1B-C5DF58584E8D}" type="slidenum">
               <a:rPr lang="en-US" smtClean="0"/>
+              <a:pPr/>
               <a:t>‹#›</a:t>
             </a:fld>
             <a:endParaRPr lang="en-US"/>
@@ -7885,7 +7941,8 @@
           <a:p>
             <a:fld id="{03A9975F-C47A-452A-85E0-869F4D5D71B0}" type="datetimeFigureOut">
               <a:rPr lang="en-US" smtClean="0"/>
-              <a:t>10/11/2010</a:t>
+              <a:pPr/>
+              <a:t>10/22/2010</a:t>
             </a:fld>
             <a:endParaRPr lang="en-US"/>
           </a:p>
@@ -7927,6 +7984,7 @@
           <a:p>
             <a:fld id="{9CC4E57B-EE81-4B19-BE1B-C5DF58584E8D}" type="slidenum">
               <a:rPr lang="en-US" smtClean="0"/>
+              <a:pPr/>
               <a:t>‹#›</a:t>
             </a:fld>
             <a:endParaRPr lang="en-US"/>
@@ -8019,7 +8077,8 @@
           <a:p>
             <a:fld id="{03A9975F-C47A-452A-85E0-869F4D5D71B0}" type="datetimeFigureOut">
               <a:rPr lang="en-US" smtClean="0"/>
-              <a:t>10/11/2010</a:t>
+              <a:pPr/>
+              <a:t>10/22/2010</a:t>
             </a:fld>
             <a:endParaRPr lang="en-US"/>
           </a:p>
@@ -8061,6 +8120,7 @@
           <a:p>
             <a:fld id="{9CC4E57B-EE81-4B19-BE1B-C5DF58584E8D}" type="slidenum">
               <a:rPr lang="en-US" smtClean="0"/>
+              <a:pPr/>
               <a:t>‹#›</a:t>
             </a:fld>
             <a:endParaRPr lang="en-US"/>
@@ -8322,7 +8382,8 @@
           <a:p>
             <a:fld id="{03A9975F-C47A-452A-85E0-869F4D5D71B0}" type="datetimeFigureOut">
               <a:rPr lang="en-US" smtClean="0"/>
-              <a:t>10/11/2010</a:t>
+              <a:pPr/>
+              <a:t>10/22/2010</a:t>
             </a:fld>
             <a:endParaRPr lang="en-US"/>
           </a:p>
@@ -8400,6 +8461,7 @@
           <a:p>
             <a:fld id="{9CC4E57B-EE81-4B19-BE1B-C5DF58584E8D}" type="slidenum">
               <a:rPr lang="en-US" smtClean="0"/>
+              <a:pPr/>
               <a:t>‹#›</a:t>
             </a:fld>
             <a:endParaRPr lang="en-US"/>

</xml_diff>